<commit_message>
added nextjs lecture slides
</commit_message>
<xml_diff>
--- a/nextjs/Next.js.pptx
+++ b/nextjs/Next.js.pptx
@@ -15,24 +15,24 @@
     <p:sldId id="355" r:id="rId6"/>
     <p:sldId id="356" r:id="rId7"/>
     <p:sldId id="357" r:id="rId8"/>
-    <p:sldId id="363" r:id="rId9"/>
-    <p:sldId id="364" r:id="rId10"/>
-    <p:sldId id="365" r:id="rId11"/>
-    <p:sldId id="366" r:id="rId12"/>
-    <p:sldId id="358" r:id="rId13"/>
-    <p:sldId id="368" r:id="rId14"/>
-    <p:sldId id="369" r:id="rId15"/>
-    <p:sldId id="367" r:id="rId16"/>
-    <p:sldId id="371" r:id="rId17"/>
-    <p:sldId id="372" r:id="rId18"/>
-    <p:sldId id="373" r:id="rId19"/>
-    <p:sldId id="376" r:id="rId20"/>
-    <p:sldId id="374" r:id="rId21"/>
-    <p:sldId id="375" r:id="rId22"/>
-    <p:sldId id="370" r:id="rId23"/>
-    <p:sldId id="377" r:id="rId24"/>
-    <p:sldId id="361" r:id="rId25"/>
-    <p:sldId id="359" r:id="rId26"/>
+    <p:sldId id="359" r:id="rId9"/>
+    <p:sldId id="363" r:id="rId10"/>
+    <p:sldId id="364" r:id="rId11"/>
+    <p:sldId id="365" r:id="rId12"/>
+    <p:sldId id="366" r:id="rId13"/>
+    <p:sldId id="358" r:id="rId14"/>
+    <p:sldId id="368" r:id="rId15"/>
+    <p:sldId id="369" r:id="rId16"/>
+    <p:sldId id="367" r:id="rId17"/>
+    <p:sldId id="371" r:id="rId18"/>
+    <p:sldId id="372" r:id="rId19"/>
+    <p:sldId id="373" r:id="rId20"/>
+    <p:sldId id="376" r:id="rId21"/>
+    <p:sldId id="374" r:id="rId22"/>
+    <p:sldId id="375" r:id="rId23"/>
+    <p:sldId id="370" r:id="rId24"/>
+    <p:sldId id="377" r:id="rId25"/>
+    <p:sldId id="361" r:id="rId26"/>
   </p:sldIdLst>
   <p:sldSz cx="12192000" cy="6858000"/>
   <p:notesSz cx="12192000" cy="6858000"/>
@@ -810,7 +810,7 @@
     </p:spTree>
     <p:extLst>
       <p:ext uri="{BB962C8B-B14F-4D97-AF65-F5344CB8AC3E}">
-        <p14:creationId xmlns:p14="http://schemas.microsoft.com/office/powerpoint/2010/main" val="2677256610"/>
+        <p14:creationId xmlns:p14="http://schemas.microsoft.com/office/powerpoint/2010/main" val="93399334"/>
       </p:ext>
     </p:extLst>
   </p:cSld>
@@ -969,7 +969,7 @@
     </p:spTree>
     <p:extLst>
       <p:ext uri="{BB962C8B-B14F-4D97-AF65-F5344CB8AC3E}">
-        <p14:creationId xmlns:p14="http://schemas.microsoft.com/office/powerpoint/2010/main" val="4104020090"/>
+        <p14:creationId xmlns:p14="http://schemas.microsoft.com/office/powerpoint/2010/main" val="2677256610"/>
       </p:ext>
     </p:extLst>
   </p:cSld>
@@ -1128,7 +1128,7 @@
     </p:spTree>
     <p:extLst>
       <p:ext uri="{BB962C8B-B14F-4D97-AF65-F5344CB8AC3E}">
-        <p14:creationId xmlns:p14="http://schemas.microsoft.com/office/powerpoint/2010/main" val="2436393499"/>
+        <p14:creationId xmlns:p14="http://schemas.microsoft.com/office/powerpoint/2010/main" val="4104020090"/>
       </p:ext>
     </p:extLst>
   </p:cSld>
@@ -1287,7 +1287,7 @@
     </p:spTree>
     <p:extLst>
       <p:ext uri="{BB962C8B-B14F-4D97-AF65-F5344CB8AC3E}">
-        <p14:creationId xmlns:p14="http://schemas.microsoft.com/office/powerpoint/2010/main" val="3433179969"/>
+        <p14:creationId xmlns:p14="http://schemas.microsoft.com/office/powerpoint/2010/main" val="2436393499"/>
       </p:ext>
     </p:extLst>
   </p:cSld>
@@ -1446,7 +1446,7 @@
     </p:spTree>
     <p:extLst>
       <p:ext uri="{BB962C8B-B14F-4D97-AF65-F5344CB8AC3E}">
-        <p14:creationId xmlns:p14="http://schemas.microsoft.com/office/powerpoint/2010/main" val="873353531"/>
+        <p14:creationId xmlns:p14="http://schemas.microsoft.com/office/powerpoint/2010/main" val="3433179969"/>
       </p:ext>
     </p:extLst>
   </p:cSld>
@@ -1605,7 +1605,7 @@
     </p:spTree>
     <p:extLst>
       <p:ext uri="{BB962C8B-B14F-4D97-AF65-F5344CB8AC3E}">
-        <p14:creationId xmlns:p14="http://schemas.microsoft.com/office/powerpoint/2010/main" val="2144984435"/>
+        <p14:creationId xmlns:p14="http://schemas.microsoft.com/office/powerpoint/2010/main" val="873353531"/>
       </p:ext>
     </p:extLst>
   </p:cSld>
@@ -1764,7 +1764,7 @@
     </p:spTree>
     <p:extLst>
       <p:ext uri="{BB962C8B-B14F-4D97-AF65-F5344CB8AC3E}">
-        <p14:creationId xmlns:p14="http://schemas.microsoft.com/office/powerpoint/2010/main" val="345442507"/>
+        <p14:creationId xmlns:p14="http://schemas.microsoft.com/office/powerpoint/2010/main" val="2144984435"/>
       </p:ext>
     </p:extLst>
   </p:cSld>
@@ -1923,7 +1923,7 @@
     </p:spTree>
     <p:extLst>
       <p:ext uri="{BB962C8B-B14F-4D97-AF65-F5344CB8AC3E}">
-        <p14:creationId xmlns:p14="http://schemas.microsoft.com/office/powerpoint/2010/main" val="2973497591"/>
+        <p14:creationId xmlns:p14="http://schemas.microsoft.com/office/powerpoint/2010/main" val="345442507"/>
       </p:ext>
     </p:extLst>
   </p:cSld>
@@ -2082,7 +2082,7 @@
     </p:spTree>
     <p:extLst>
       <p:ext uri="{BB962C8B-B14F-4D97-AF65-F5344CB8AC3E}">
-        <p14:creationId xmlns:p14="http://schemas.microsoft.com/office/powerpoint/2010/main" val="1036879151"/>
+        <p14:creationId xmlns:p14="http://schemas.microsoft.com/office/powerpoint/2010/main" val="2973497591"/>
       </p:ext>
     </p:extLst>
   </p:cSld>
@@ -2241,7 +2241,7 @@
     </p:spTree>
     <p:extLst>
       <p:ext uri="{BB962C8B-B14F-4D97-AF65-F5344CB8AC3E}">
-        <p14:creationId xmlns:p14="http://schemas.microsoft.com/office/powerpoint/2010/main" val="212966480"/>
+        <p14:creationId xmlns:p14="http://schemas.microsoft.com/office/powerpoint/2010/main" val="1036879151"/>
       </p:ext>
     </p:extLst>
   </p:cSld>
@@ -2559,7 +2559,7 @@
     </p:spTree>
     <p:extLst>
       <p:ext uri="{BB962C8B-B14F-4D97-AF65-F5344CB8AC3E}">
-        <p14:creationId xmlns:p14="http://schemas.microsoft.com/office/powerpoint/2010/main" val="3411149329"/>
+        <p14:creationId xmlns:p14="http://schemas.microsoft.com/office/powerpoint/2010/main" val="212966480"/>
       </p:ext>
     </p:extLst>
   </p:cSld>
@@ -2718,7 +2718,7 @@
     </p:spTree>
     <p:extLst>
       <p:ext uri="{BB962C8B-B14F-4D97-AF65-F5344CB8AC3E}">
-        <p14:creationId xmlns:p14="http://schemas.microsoft.com/office/powerpoint/2010/main" val="4051139614"/>
+        <p14:creationId xmlns:p14="http://schemas.microsoft.com/office/powerpoint/2010/main" val="3411149329"/>
       </p:ext>
     </p:extLst>
   </p:cSld>
@@ -2877,7 +2877,7 @@
     </p:spTree>
     <p:extLst>
       <p:ext uri="{BB962C8B-B14F-4D97-AF65-F5344CB8AC3E}">
-        <p14:creationId xmlns:p14="http://schemas.microsoft.com/office/powerpoint/2010/main" val="1373124251"/>
+        <p14:creationId xmlns:p14="http://schemas.microsoft.com/office/powerpoint/2010/main" val="4051139614"/>
       </p:ext>
     </p:extLst>
   </p:cSld>
@@ -3036,7 +3036,7 @@
     </p:spTree>
     <p:extLst>
       <p:ext uri="{BB962C8B-B14F-4D97-AF65-F5344CB8AC3E}">
-        <p14:creationId xmlns:p14="http://schemas.microsoft.com/office/powerpoint/2010/main" val="1170191474"/>
+        <p14:creationId xmlns:p14="http://schemas.microsoft.com/office/powerpoint/2010/main" val="1373124251"/>
       </p:ext>
     </p:extLst>
   </p:cSld>
@@ -3195,7 +3195,7 @@
     </p:spTree>
     <p:extLst>
       <p:ext uri="{BB962C8B-B14F-4D97-AF65-F5344CB8AC3E}">
-        <p14:creationId xmlns:p14="http://schemas.microsoft.com/office/powerpoint/2010/main" val="1250018641"/>
+        <p14:creationId xmlns:p14="http://schemas.microsoft.com/office/powerpoint/2010/main" val="1170191474"/>
       </p:ext>
     </p:extLst>
   </p:cSld>
@@ -3990,7 +3990,7 @@
     </p:spTree>
     <p:extLst>
       <p:ext uri="{BB962C8B-B14F-4D97-AF65-F5344CB8AC3E}">
-        <p14:creationId xmlns:p14="http://schemas.microsoft.com/office/powerpoint/2010/main" val="3939864686"/>
+        <p14:creationId xmlns:p14="http://schemas.microsoft.com/office/powerpoint/2010/main" val="1250018641"/>
       </p:ext>
     </p:extLst>
   </p:cSld>
@@ -4149,7 +4149,7 @@
     </p:spTree>
     <p:extLst>
       <p:ext uri="{BB962C8B-B14F-4D97-AF65-F5344CB8AC3E}">
-        <p14:creationId xmlns:p14="http://schemas.microsoft.com/office/powerpoint/2010/main" val="2453676171"/>
+        <p14:creationId xmlns:p14="http://schemas.microsoft.com/office/powerpoint/2010/main" val="3939864686"/>
       </p:ext>
     </p:extLst>
   </p:cSld>
@@ -4308,7 +4308,7 @@
     </p:spTree>
     <p:extLst>
       <p:ext uri="{BB962C8B-B14F-4D97-AF65-F5344CB8AC3E}">
-        <p14:creationId xmlns:p14="http://schemas.microsoft.com/office/powerpoint/2010/main" val="93399334"/>
+        <p14:creationId xmlns:p14="http://schemas.microsoft.com/office/powerpoint/2010/main" val="2453676171"/>
       </p:ext>
     </p:extLst>
   </p:cSld>
@@ -6187,12 +6187,8 @@
               </a:spcBef>
             </a:pPr>
             <a:r>
-              <a:rPr lang="en-US" sz="7200"/>
-              <a:t>Next</a:t>
-            </a:r>
-            <a:r>
               <a:rPr lang="en-US" sz="7200" dirty="0" err="1"/>
-              <a:t>.js</a:t>
+              <a:t>Next.js</a:t>
             </a:r>
             <a:endParaRPr sz="7200" dirty="0"/>
           </a:p>
@@ -6293,6 +6289,257 @@
 </file>
 
 <file path=ppt/slides/slide10.xml><?xml version="1.0" encoding="utf-8"?>
+<p:sld xmlns:a="http://schemas.openxmlformats.org/drawingml/2006/main" xmlns:r="http://schemas.openxmlformats.org/officeDocument/2006/relationships" xmlns:p="http://schemas.openxmlformats.org/presentationml/2006/main">
+  <p:cSld>
+    <p:spTree>
+      <p:nvGrpSpPr>
+        <p:cNvPr id="1" name=""/>
+        <p:cNvGrpSpPr/>
+        <p:nvPr/>
+      </p:nvGrpSpPr>
+      <p:grpSpPr>
+        <a:xfrm>
+          <a:off x="0" y="0"/>
+          <a:ext cx="0" cy="0"/>
+          <a:chOff x="0" y="0"/>
+          <a:chExt cx="0" cy="0"/>
+        </a:xfrm>
+      </p:grpSpPr>
+      <p:sp>
+        <p:nvSpPr>
+          <p:cNvPr id="2" name="object 2"/>
+          <p:cNvSpPr/>
+          <p:nvPr/>
+        </p:nvSpPr>
+        <p:spPr>
+          <a:xfrm>
+            <a:off x="0" y="6334316"/>
+            <a:ext cx="12192000" cy="66040"/>
+          </a:xfrm>
+          <a:custGeom>
+            <a:avLst/>
+            <a:gdLst/>
+            <a:ahLst/>
+            <a:cxnLst/>
+            <a:rect l="l" t="t" r="r" b="b"/>
+            <a:pathLst>
+              <a:path w="12192000" h="66039">
+                <a:moveTo>
+                  <a:pt x="0" y="65998"/>
+                </a:moveTo>
+                <a:lnTo>
+                  <a:pt x="12192001" y="65998"/>
+                </a:lnTo>
+                <a:lnTo>
+                  <a:pt x="12192001" y="0"/>
+                </a:lnTo>
+                <a:lnTo>
+                  <a:pt x="0" y="0"/>
+                </a:lnTo>
+                <a:lnTo>
+                  <a:pt x="0" y="65998"/>
+                </a:lnTo>
+                <a:close/>
+              </a:path>
+            </a:pathLst>
+          </a:custGeom>
+          <a:solidFill>
+            <a:srgbClr val="E48312"/>
+          </a:solidFill>
+        </p:spPr>
+        <p:txBody>
+          <a:bodyPr wrap="square" lIns="0" tIns="0" rIns="0" bIns="0" rtlCol="0"/>
+          <a:lstStyle/>
+          <a:p>
+            <a:endParaRPr/>
+          </a:p>
+        </p:txBody>
+      </p:sp>
+      <p:sp>
+        <p:nvSpPr>
+          <p:cNvPr id="3" name="object 3"/>
+          <p:cNvSpPr/>
+          <p:nvPr/>
+        </p:nvSpPr>
+        <p:spPr>
+          <a:xfrm>
+            <a:off x="1193531" y="1737845"/>
+            <a:ext cx="9966960" cy="0"/>
+          </a:xfrm>
+          <a:custGeom>
+            <a:avLst/>
+            <a:gdLst/>
+            <a:ahLst/>
+            <a:cxnLst/>
+            <a:rect l="l" t="t" r="r" b="b"/>
+            <a:pathLst>
+              <a:path w="9966960">
+                <a:moveTo>
+                  <a:pt x="0" y="0"/>
+                </a:moveTo>
+                <a:lnTo>
+                  <a:pt x="9966960" y="1"/>
+                </a:lnTo>
+              </a:path>
+            </a:pathLst>
+          </a:custGeom>
+          <a:ln w="8466">
+            <a:solidFill>
+              <a:srgbClr val="7F7F7F"/>
+            </a:solidFill>
+          </a:ln>
+        </p:spPr>
+        <p:txBody>
+          <a:bodyPr wrap="square" lIns="0" tIns="0" rIns="0" bIns="0" rtlCol="0"/>
+          <a:lstStyle/>
+          <a:p>
+            <a:endParaRPr/>
+          </a:p>
+        </p:txBody>
+      </p:sp>
+      <p:sp>
+        <p:nvSpPr>
+          <p:cNvPr id="4" name="object 4"/>
+          <p:cNvSpPr txBox="1">
+            <a:spLocks noGrp="1"/>
+          </p:cNvSpPr>
+          <p:nvPr>
+            <p:ph type="title"/>
+          </p:nvPr>
+        </p:nvSpPr>
+        <p:spPr>
+          <a:xfrm>
+            <a:off x="1176020" y="910166"/>
+            <a:ext cx="8915400" cy="751488"/>
+          </a:xfrm>
+          <a:prstGeom prst="rect">
+            <a:avLst/>
+          </a:prstGeom>
+        </p:spPr>
+        <p:txBody>
+          <a:bodyPr vert="horz" wrap="square" lIns="0" tIns="12700" rIns="0" bIns="0" rtlCol="0">
+            <a:spAutoFit/>
+          </a:bodyPr>
+          <a:lstStyle/>
+          <a:p>
+            <a:pPr marL="12700">
+              <a:lnSpc>
+                <a:spcPct val="100000"/>
+              </a:lnSpc>
+              <a:spcBef>
+                <a:spcPts val="100"/>
+              </a:spcBef>
+            </a:pPr>
+            <a:r>
+              <a:rPr lang="en-US" sz="4800" dirty="0">
+                <a:solidFill>
+                  <a:srgbClr val="404040"/>
+                </a:solidFill>
+              </a:rPr>
+              <a:t>Using Shared Components</a:t>
+            </a:r>
+            <a:endParaRPr sz="4800" dirty="0"/>
+          </a:p>
+        </p:txBody>
+      </p:sp>
+      <p:sp>
+        <p:nvSpPr>
+          <p:cNvPr id="7" name="TextBox 6">
+            <a:extLst>
+              <a:ext uri="{FF2B5EF4-FFF2-40B4-BE49-F238E27FC236}">
+                <a16:creationId xmlns:a16="http://schemas.microsoft.com/office/drawing/2014/main" id="{AFBA96A7-5F05-3842-8A2C-899733C37A06}"/>
+              </a:ext>
+            </a:extLst>
+          </p:cNvPr>
+          <p:cNvSpPr txBox="1"/>
+          <p:nvPr/>
+        </p:nvSpPr>
+        <p:spPr>
+          <a:xfrm>
+            <a:off x="-10886" y="6629400"/>
+            <a:ext cx="5192486" cy="276999"/>
+          </a:xfrm>
+          <a:prstGeom prst="rect">
+            <a:avLst/>
+          </a:prstGeom>
+          <a:noFill/>
+        </p:spPr>
+        <p:txBody>
+          <a:bodyPr wrap="square" rtlCol="0">
+            <a:spAutoFit/>
+          </a:bodyPr>
+          <a:lstStyle/>
+          <a:p>
+            <a:r>
+              <a:rPr lang="en-US" sz="1200" dirty="0"/>
+              <a:t>Source:  https://</a:t>
+            </a:r>
+            <a:r>
+              <a:rPr lang="en-US" sz="1200" dirty="0" err="1"/>
+              <a:t>reactjs.org</a:t>
+            </a:r>
+            <a:r>
+              <a:rPr lang="en-US" sz="1200" dirty="0"/>
+              <a:t>/docs/handling-</a:t>
+            </a:r>
+            <a:r>
+              <a:rPr lang="en-US" sz="1200" dirty="0" err="1"/>
+              <a:t>events.html</a:t>
+            </a:r>
+            <a:endParaRPr lang="en-US" sz="1200" dirty="0"/>
+          </a:p>
+        </p:txBody>
+      </p:sp>
+      <p:pic>
+        <p:nvPicPr>
+          <p:cNvPr id="6" name="Picture 5" descr="A screenshot of a social media post&#10;&#10;Description automatically generated">
+            <a:extLst>
+              <a:ext uri="{FF2B5EF4-FFF2-40B4-BE49-F238E27FC236}">
+                <a16:creationId xmlns:a16="http://schemas.microsoft.com/office/drawing/2014/main" id="{C0768370-A848-7045-9528-8DBDBFCE63DA}"/>
+              </a:ext>
+            </a:extLst>
+          </p:cNvPr>
+          <p:cNvPicPr>
+            <a:picLocks noChangeAspect="1"/>
+          </p:cNvPicPr>
+          <p:nvPr/>
+        </p:nvPicPr>
+        <p:blipFill>
+          <a:blip r:embed="rId3">
+            <a:extLst>
+              <a:ext uri="{28A0092B-C50C-407E-A947-70E740481C1C}">
+                <a14:useLocalDpi xmlns:a14="http://schemas.microsoft.com/office/drawing/2010/main" val="0"/>
+              </a:ext>
+            </a:extLst>
+          </a:blip>
+          <a:stretch>
+            <a:fillRect/>
+          </a:stretch>
+        </p:blipFill>
+        <p:spPr>
+          <a:xfrm>
+            <a:off x="3940541" y="1661654"/>
+            <a:ext cx="4472940" cy="4663440"/>
+          </a:xfrm>
+          <a:prstGeom prst="rect">
+            <a:avLst/>
+          </a:prstGeom>
+        </p:spPr>
+      </p:pic>
+    </p:spTree>
+    <p:extLst>
+      <p:ext uri="{BB962C8B-B14F-4D97-AF65-F5344CB8AC3E}">
+        <p14:creationId xmlns:p14="http://schemas.microsoft.com/office/powerpoint/2010/main" val="2443201002"/>
+      </p:ext>
+    </p:extLst>
+  </p:cSld>
+  <p:clrMapOvr>
+    <a:masterClrMapping/>
+  </p:clrMapOvr>
+</p:sld>
+</file>
+
+<file path=ppt/slides/slide11.xml><?xml version="1.0" encoding="utf-8"?>
 <p:sld xmlns:a="http://schemas.openxmlformats.org/drawingml/2006/main" xmlns:r="http://schemas.openxmlformats.org/officeDocument/2006/relationships" xmlns:p="http://schemas.openxmlformats.org/presentationml/2006/main">
   <p:cSld>
     <p:spTree>
@@ -6543,7 +6790,7 @@
 </p:sld>
 </file>
 
-<file path=ppt/slides/slide11.xml><?xml version="1.0" encoding="utf-8"?>
+<file path=ppt/slides/slide12.xml><?xml version="1.0" encoding="utf-8"?>
 <p:sld xmlns:a="http://schemas.openxmlformats.org/drawingml/2006/main" xmlns:r="http://schemas.openxmlformats.org/officeDocument/2006/relationships" xmlns:p="http://schemas.openxmlformats.org/presentationml/2006/main">
   <p:cSld>
     <p:spTree>
@@ -6873,7 +7120,7 @@
 </p:sld>
 </file>
 
-<file path=ppt/slides/slide12.xml><?xml version="1.0" encoding="utf-8"?>
+<file path=ppt/slides/slide13.xml><?xml version="1.0" encoding="utf-8"?>
 <p:sld xmlns:a="http://schemas.openxmlformats.org/drawingml/2006/main" xmlns:r="http://schemas.openxmlformats.org/officeDocument/2006/relationships" xmlns:p="http://schemas.openxmlformats.org/presentationml/2006/main">
   <p:cSld>
     <p:spTree>
@@ -7124,7 +7371,7 @@
 </p:sld>
 </file>
 
-<file path=ppt/slides/slide13.xml><?xml version="1.0" encoding="utf-8"?>
+<file path=ppt/slides/slide14.xml><?xml version="1.0" encoding="utf-8"?>
 <p:sld xmlns:a="http://schemas.openxmlformats.org/drawingml/2006/main" xmlns:r="http://schemas.openxmlformats.org/officeDocument/2006/relationships" xmlns:p="http://schemas.openxmlformats.org/presentationml/2006/main">
   <p:cSld>
     <p:spTree>
@@ -7411,7 +7658,7 @@
 </p:sld>
 </file>
 
-<file path=ppt/slides/slide14.xml><?xml version="1.0" encoding="utf-8"?>
+<file path=ppt/slides/slide15.xml><?xml version="1.0" encoding="utf-8"?>
 <p:sld xmlns:a="http://schemas.openxmlformats.org/drawingml/2006/main" xmlns:r="http://schemas.openxmlformats.org/officeDocument/2006/relationships" xmlns:p="http://schemas.openxmlformats.org/presentationml/2006/main">
   <p:cSld>
     <p:spTree>
@@ -7698,7 +7945,7 @@
 </p:sld>
 </file>
 
-<file path=ppt/slides/slide15.xml><?xml version="1.0" encoding="utf-8"?>
+<file path=ppt/slides/slide16.xml><?xml version="1.0" encoding="utf-8"?>
 <p:sld xmlns:a="http://schemas.openxmlformats.org/drawingml/2006/main" xmlns:r="http://schemas.openxmlformats.org/officeDocument/2006/relationships" xmlns:p="http://schemas.openxmlformats.org/presentationml/2006/main">
   <p:cSld>
     <p:spTree>
@@ -8030,7 +8277,7 @@
 </p:sld>
 </file>
 
-<file path=ppt/slides/slide16.xml><?xml version="1.0" encoding="utf-8"?>
+<file path=ppt/slides/slide17.xml><?xml version="1.0" encoding="utf-8"?>
 <p:sld xmlns:a="http://schemas.openxmlformats.org/drawingml/2006/main" xmlns:r="http://schemas.openxmlformats.org/officeDocument/2006/relationships" xmlns:p="http://schemas.openxmlformats.org/presentationml/2006/main">
   <p:cSld>
     <p:spTree>
@@ -8430,7 +8677,7 @@
 </p:sld>
 </file>
 
-<file path=ppt/slides/slide17.xml><?xml version="1.0" encoding="utf-8"?>
+<file path=ppt/slides/slide18.xml><?xml version="1.0" encoding="utf-8"?>
 <p:sld xmlns:a="http://schemas.openxmlformats.org/drawingml/2006/main" xmlns:r="http://schemas.openxmlformats.org/officeDocument/2006/relationships" xmlns:p="http://schemas.openxmlformats.org/presentationml/2006/main">
   <p:cSld>
     <p:spTree>
@@ -8733,7 +8980,7 @@
 </p:sld>
 </file>
 
-<file path=ppt/slides/slide18.xml><?xml version="1.0" encoding="utf-8"?>
+<file path=ppt/slides/slide19.xml><?xml version="1.0" encoding="utf-8"?>
 <p:sld xmlns:a="http://schemas.openxmlformats.org/drawingml/2006/main" xmlns:r="http://schemas.openxmlformats.org/officeDocument/2006/relationships" xmlns:p="http://schemas.openxmlformats.org/presentationml/2006/main">
   <p:cSld>
     <p:spTree>
@@ -8984,7 +9231,304 @@
 </p:sld>
 </file>
 
-<file path=ppt/slides/slide19.xml><?xml version="1.0" encoding="utf-8"?>
+<file path=ppt/slides/slide2.xml><?xml version="1.0" encoding="utf-8"?>
+<p:sld xmlns:a="http://schemas.openxmlformats.org/drawingml/2006/main" xmlns:r="http://schemas.openxmlformats.org/officeDocument/2006/relationships" xmlns:p="http://schemas.openxmlformats.org/presentationml/2006/main">
+  <p:cSld>
+    <p:spTree>
+      <p:nvGrpSpPr>
+        <p:cNvPr id="1" name=""/>
+        <p:cNvGrpSpPr/>
+        <p:nvPr/>
+      </p:nvGrpSpPr>
+      <p:grpSpPr>
+        <a:xfrm>
+          <a:off x="0" y="0"/>
+          <a:ext cx="0" cy="0"/>
+          <a:chOff x="0" y="0"/>
+          <a:chExt cx="0" cy="0"/>
+        </a:xfrm>
+      </p:grpSpPr>
+      <p:sp>
+        <p:nvSpPr>
+          <p:cNvPr id="2" name="object 2"/>
+          <p:cNvSpPr/>
+          <p:nvPr/>
+        </p:nvSpPr>
+        <p:spPr>
+          <a:xfrm>
+            <a:off x="0" y="6334316"/>
+            <a:ext cx="12192000" cy="66040"/>
+          </a:xfrm>
+          <a:custGeom>
+            <a:avLst/>
+            <a:gdLst/>
+            <a:ahLst/>
+            <a:cxnLst/>
+            <a:rect l="l" t="t" r="r" b="b"/>
+            <a:pathLst>
+              <a:path w="12192000" h="66039">
+                <a:moveTo>
+                  <a:pt x="0" y="65998"/>
+                </a:moveTo>
+                <a:lnTo>
+                  <a:pt x="12192001" y="65998"/>
+                </a:lnTo>
+                <a:lnTo>
+                  <a:pt x="12192001" y="0"/>
+                </a:lnTo>
+                <a:lnTo>
+                  <a:pt x="0" y="0"/>
+                </a:lnTo>
+                <a:lnTo>
+                  <a:pt x="0" y="65998"/>
+                </a:lnTo>
+                <a:close/>
+              </a:path>
+            </a:pathLst>
+          </a:custGeom>
+          <a:solidFill>
+            <a:srgbClr val="E48312"/>
+          </a:solidFill>
+        </p:spPr>
+        <p:txBody>
+          <a:bodyPr wrap="square" lIns="0" tIns="0" rIns="0" bIns="0" rtlCol="0"/>
+          <a:lstStyle/>
+          <a:p>
+            <a:endParaRPr/>
+          </a:p>
+        </p:txBody>
+      </p:sp>
+      <p:sp>
+        <p:nvSpPr>
+          <p:cNvPr id="3" name="object 3"/>
+          <p:cNvSpPr/>
+          <p:nvPr/>
+        </p:nvSpPr>
+        <p:spPr>
+          <a:xfrm>
+            <a:off x="1193531" y="1737845"/>
+            <a:ext cx="9966960" cy="0"/>
+          </a:xfrm>
+          <a:custGeom>
+            <a:avLst/>
+            <a:gdLst/>
+            <a:ahLst/>
+            <a:cxnLst/>
+            <a:rect l="l" t="t" r="r" b="b"/>
+            <a:pathLst>
+              <a:path w="9966960">
+                <a:moveTo>
+                  <a:pt x="0" y="0"/>
+                </a:moveTo>
+                <a:lnTo>
+                  <a:pt x="9966960" y="1"/>
+                </a:lnTo>
+              </a:path>
+            </a:pathLst>
+          </a:custGeom>
+          <a:ln w="8466">
+            <a:solidFill>
+              <a:srgbClr val="7F7F7F"/>
+            </a:solidFill>
+          </a:ln>
+        </p:spPr>
+        <p:txBody>
+          <a:bodyPr wrap="square" lIns="0" tIns="0" rIns="0" bIns="0" rtlCol="0"/>
+          <a:lstStyle/>
+          <a:p>
+            <a:endParaRPr/>
+          </a:p>
+        </p:txBody>
+      </p:sp>
+      <p:sp>
+        <p:nvSpPr>
+          <p:cNvPr id="4" name="object 4"/>
+          <p:cNvSpPr txBox="1">
+            <a:spLocks noGrp="1"/>
+          </p:cNvSpPr>
+          <p:nvPr>
+            <p:ph type="title"/>
+          </p:nvPr>
+        </p:nvSpPr>
+        <p:spPr>
+          <a:xfrm>
+            <a:off x="1176020" y="910166"/>
+            <a:ext cx="6824980" cy="751488"/>
+          </a:xfrm>
+          <a:prstGeom prst="rect">
+            <a:avLst/>
+          </a:prstGeom>
+        </p:spPr>
+        <p:txBody>
+          <a:bodyPr vert="horz" wrap="square" lIns="0" tIns="12700" rIns="0" bIns="0" rtlCol="0">
+            <a:spAutoFit/>
+          </a:bodyPr>
+          <a:lstStyle/>
+          <a:p>
+            <a:pPr marL="12700">
+              <a:lnSpc>
+                <a:spcPct val="100000"/>
+              </a:lnSpc>
+              <a:spcBef>
+                <a:spcPts val="100"/>
+              </a:spcBef>
+            </a:pPr>
+            <a:r>
+              <a:rPr lang="en-US" sz="4800" dirty="0">
+                <a:solidFill>
+                  <a:srgbClr val="404040"/>
+                </a:solidFill>
+              </a:rPr>
+              <a:t>What is </a:t>
+            </a:r>
+            <a:r>
+              <a:rPr lang="en-US" sz="4800" dirty="0" err="1">
+                <a:solidFill>
+                  <a:srgbClr val="404040"/>
+                </a:solidFill>
+              </a:rPr>
+              <a:t>Next.js</a:t>
+            </a:r>
+            <a:r>
+              <a:rPr lang="en-US" sz="4800" dirty="0">
+                <a:solidFill>
+                  <a:srgbClr val="404040"/>
+                </a:solidFill>
+              </a:rPr>
+              <a:t>?</a:t>
+            </a:r>
+            <a:endParaRPr sz="4800" dirty="0"/>
+          </a:p>
+        </p:txBody>
+      </p:sp>
+      <p:sp>
+        <p:nvSpPr>
+          <p:cNvPr id="7" name="TextBox 6">
+            <a:extLst>
+              <a:ext uri="{FF2B5EF4-FFF2-40B4-BE49-F238E27FC236}">
+                <a16:creationId xmlns:a16="http://schemas.microsoft.com/office/drawing/2014/main" id="{AFBA96A7-5F05-3842-8A2C-899733C37A06}"/>
+              </a:ext>
+            </a:extLst>
+          </p:cNvPr>
+          <p:cNvSpPr txBox="1"/>
+          <p:nvPr/>
+        </p:nvSpPr>
+        <p:spPr>
+          <a:xfrm>
+            <a:off x="-10886" y="6629400"/>
+            <a:ext cx="5192486" cy="276999"/>
+          </a:xfrm>
+          <a:prstGeom prst="rect">
+            <a:avLst/>
+          </a:prstGeom>
+          <a:noFill/>
+        </p:spPr>
+        <p:txBody>
+          <a:bodyPr wrap="square" rtlCol="0">
+            <a:spAutoFit/>
+          </a:bodyPr>
+          <a:lstStyle/>
+          <a:p>
+            <a:r>
+              <a:rPr lang="en-US" sz="1200" dirty="0"/>
+              <a:t>Source:  https://</a:t>
+            </a:r>
+            <a:r>
+              <a:rPr lang="en-US" sz="1200" dirty="0" err="1"/>
+              <a:t>reactjs.org</a:t>
+            </a:r>
+            <a:r>
+              <a:rPr lang="en-US" sz="1200" dirty="0"/>
+              <a:t>/docs/handling-</a:t>
+            </a:r>
+            <a:r>
+              <a:rPr lang="en-US" sz="1200" dirty="0" err="1"/>
+              <a:t>events.html</a:t>
+            </a:r>
+            <a:endParaRPr lang="en-US" sz="1200" dirty="0"/>
+          </a:p>
+        </p:txBody>
+      </p:sp>
+      <p:sp>
+        <p:nvSpPr>
+          <p:cNvPr id="5" name="TextBox 4">
+            <a:extLst>
+              <a:ext uri="{FF2B5EF4-FFF2-40B4-BE49-F238E27FC236}">
+                <a16:creationId xmlns:a16="http://schemas.microsoft.com/office/drawing/2014/main" id="{5186C368-7C3A-8240-911F-9C466113512E}"/>
+              </a:ext>
+            </a:extLst>
+          </p:cNvPr>
+          <p:cNvSpPr txBox="1"/>
+          <p:nvPr/>
+        </p:nvSpPr>
+        <p:spPr>
+          <a:xfrm>
+            <a:off x="838200" y="1905000"/>
+            <a:ext cx="10744200" cy="4062651"/>
+          </a:xfrm>
+          <a:prstGeom prst="rect">
+            <a:avLst/>
+          </a:prstGeom>
+          <a:noFill/>
+        </p:spPr>
+        <p:txBody>
+          <a:bodyPr wrap="square" rtlCol="0">
+            <a:spAutoFit/>
+          </a:bodyPr>
+          <a:lstStyle/>
+          <a:p>
+            <a:r>
+              <a:rPr lang="en-US" sz="2400" dirty="0" err="1"/>
+              <a:t>Next.js</a:t>
+            </a:r>
+            <a:r>
+              <a:rPr lang="en-US" sz="2400" dirty="0"/>
+              <a:t> is a universal JavaScript framework that runs in the browser and the server. It offers developers an easy way to get started, and as it uses </a:t>
+            </a:r>
+            <a:r>
+              <a:rPr lang="en-US" sz="2400" dirty="0" err="1"/>
+              <a:t>React.js</a:t>
+            </a:r>
+            <a:r>
+              <a:rPr lang="en-US" sz="2400" dirty="0"/>
+              <a:t> for templating. </a:t>
+            </a:r>
+          </a:p>
+          <a:p>
+            <a:endParaRPr lang="en-US" sz="2400" dirty="0"/>
+          </a:p>
+          <a:p>
+            <a:r>
+              <a:rPr lang="en-US" sz="2400" dirty="0"/>
+              <a:t> It is also a straightforward way for developers with React experience to get productive fast.</a:t>
+            </a:r>
+          </a:p>
+          <a:p>
+            <a:endParaRPr lang="en-US" sz="2400" dirty="0"/>
+          </a:p>
+          <a:p>
+            <a:endParaRPr lang="en-US" sz="2400" dirty="0"/>
+          </a:p>
+          <a:p>
+            <a:r>
+              <a:rPr lang="en-US" sz="2400" dirty="0"/>
+              <a:t>The advantages of this approach is to be able to create Rich User experiences in a uniform way, without compromising Search Engine Optimization (SEO) factors that are key to good ranking on Google and other search engines. </a:t>
+            </a:r>
+          </a:p>
+          <a:p>
+            <a:endParaRPr lang="en-US" dirty="0"/>
+          </a:p>
+        </p:txBody>
+      </p:sp>
+    </p:spTree>
+  </p:cSld>
+  <p:clrMapOvr>
+    <a:masterClrMapping/>
+  </p:clrMapOvr>
+</p:sld>
+</file>
+
+<file path=ppt/slides/slide20.xml><?xml version="1.0" encoding="utf-8"?>
 <p:sld xmlns:a="http://schemas.openxmlformats.org/drawingml/2006/main" xmlns:r="http://schemas.openxmlformats.org/officeDocument/2006/relationships" xmlns:p="http://schemas.openxmlformats.org/presentationml/2006/main">
   <p:cSld>
     <p:spTree>
@@ -9235,304 +9779,7 @@
 </p:sld>
 </file>
 
-<file path=ppt/slides/slide2.xml><?xml version="1.0" encoding="utf-8"?>
-<p:sld xmlns:a="http://schemas.openxmlformats.org/drawingml/2006/main" xmlns:r="http://schemas.openxmlformats.org/officeDocument/2006/relationships" xmlns:p="http://schemas.openxmlformats.org/presentationml/2006/main">
-  <p:cSld>
-    <p:spTree>
-      <p:nvGrpSpPr>
-        <p:cNvPr id="1" name=""/>
-        <p:cNvGrpSpPr/>
-        <p:nvPr/>
-      </p:nvGrpSpPr>
-      <p:grpSpPr>
-        <a:xfrm>
-          <a:off x="0" y="0"/>
-          <a:ext cx="0" cy="0"/>
-          <a:chOff x="0" y="0"/>
-          <a:chExt cx="0" cy="0"/>
-        </a:xfrm>
-      </p:grpSpPr>
-      <p:sp>
-        <p:nvSpPr>
-          <p:cNvPr id="2" name="object 2"/>
-          <p:cNvSpPr/>
-          <p:nvPr/>
-        </p:nvSpPr>
-        <p:spPr>
-          <a:xfrm>
-            <a:off x="0" y="6334316"/>
-            <a:ext cx="12192000" cy="66040"/>
-          </a:xfrm>
-          <a:custGeom>
-            <a:avLst/>
-            <a:gdLst/>
-            <a:ahLst/>
-            <a:cxnLst/>
-            <a:rect l="l" t="t" r="r" b="b"/>
-            <a:pathLst>
-              <a:path w="12192000" h="66039">
-                <a:moveTo>
-                  <a:pt x="0" y="65998"/>
-                </a:moveTo>
-                <a:lnTo>
-                  <a:pt x="12192001" y="65998"/>
-                </a:lnTo>
-                <a:lnTo>
-                  <a:pt x="12192001" y="0"/>
-                </a:lnTo>
-                <a:lnTo>
-                  <a:pt x="0" y="0"/>
-                </a:lnTo>
-                <a:lnTo>
-                  <a:pt x="0" y="65998"/>
-                </a:lnTo>
-                <a:close/>
-              </a:path>
-            </a:pathLst>
-          </a:custGeom>
-          <a:solidFill>
-            <a:srgbClr val="E48312"/>
-          </a:solidFill>
-        </p:spPr>
-        <p:txBody>
-          <a:bodyPr wrap="square" lIns="0" tIns="0" rIns="0" bIns="0" rtlCol="0"/>
-          <a:lstStyle/>
-          <a:p>
-            <a:endParaRPr/>
-          </a:p>
-        </p:txBody>
-      </p:sp>
-      <p:sp>
-        <p:nvSpPr>
-          <p:cNvPr id="3" name="object 3"/>
-          <p:cNvSpPr/>
-          <p:nvPr/>
-        </p:nvSpPr>
-        <p:spPr>
-          <a:xfrm>
-            <a:off x="1193531" y="1737845"/>
-            <a:ext cx="9966960" cy="0"/>
-          </a:xfrm>
-          <a:custGeom>
-            <a:avLst/>
-            <a:gdLst/>
-            <a:ahLst/>
-            <a:cxnLst/>
-            <a:rect l="l" t="t" r="r" b="b"/>
-            <a:pathLst>
-              <a:path w="9966960">
-                <a:moveTo>
-                  <a:pt x="0" y="0"/>
-                </a:moveTo>
-                <a:lnTo>
-                  <a:pt x="9966960" y="1"/>
-                </a:lnTo>
-              </a:path>
-            </a:pathLst>
-          </a:custGeom>
-          <a:ln w="8466">
-            <a:solidFill>
-              <a:srgbClr val="7F7F7F"/>
-            </a:solidFill>
-          </a:ln>
-        </p:spPr>
-        <p:txBody>
-          <a:bodyPr wrap="square" lIns="0" tIns="0" rIns="0" bIns="0" rtlCol="0"/>
-          <a:lstStyle/>
-          <a:p>
-            <a:endParaRPr/>
-          </a:p>
-        </p:txBody>
-      </p:sp>
-      <p:sp>
-        <p:nvSpPr>
-          <p:cNvPr id="4" name="object 4"/>
-          <p:cNvSpPr txBox="1">
-            <a:spLocks noGrp="1"/>
-          </p:cNvSpPr>
-          <p:nvPr>
-            <p:ph type="title"/>
-          </p:nvPr>
-        </p:nvSpPr>
-        <p:spPr>
-          <a:xfrm>
-            <a:off x="1176020" y="910166"/>
-            <a:ext cx="6824980" cy="751488"/>
-          </a:xfrm>
-          <a:prstGeom prst="rect">
-            <a:avLst/>
-          </a:prstGeom>
-        </p:spPr>
-        <p:txBody>
-          <a:bodyPr vert="horz" wrap="square" lIns="0" tIns="12700" rIns="0" bIns="0" rtlCol="0">
-            <a:spAutoFit/>
-          </a:bodyPr>
-          <a:lstStyle/>
-          <a:p>
-            <a:pPr marL="12700">
-              <a:lnSpc>
-                <a:spcPct val="100000"/>
-              </a:lnSpc>
-              <a:spcBef>
-                <a:spcPts val="100"/>
-              </a:spcBef>
-            </a:pPr>
-            <a:r>
-              <a:rPr lang="en-US" sz="4800" dirty="0">
-                <a:solidFill>
-                  <a:srgbClr val="404040"/>
-                </a:solidFill>
-              </a:rPr>
-              <a:t>What is </a:t>
-            </a:r>
-            <a:r>
-              <a:rPr lang="en-US" sz="4800" dirty="0" err="1">
-                <a:solidFill>
-                  <a:srgbClr val="404040"/>
-                </a:solidFill>
-              </a:rPr>
-              <a:t>Next.js</a:t>
-            </a:r>
-            <a:r>
-              <a:rPr lang="en-US" sz="4800" dirty="0">
-                <a:solidFill>
-                  <a:srgbClr val="404040"/>
-                </a:solidFill>
-              </a:rPr>
-              <a:t>?</a:t>
-            </a:r>
-            <a:endParaRPr sz="4800" dirty="0"/>
-          </a:p>
-        </p:txBody>
-      </p:sp>
-      <p:sp>
-        <p:nvSpPr>
-          <p:cNvPr id="7" name="TextBox 6">
-            <a:extLst>
-              <a:ext uri="{FF2B5EF4-FFF2-40B4-BE49-F238E27FC236}">
-                <a16:creationId xmlns:a16="http://schemas.microsoft.com/office/drawing/2014/main" id="{AFBA96A7-5F05-3842-8A2C-899733C37A06}"/>
-              </a:ext>
-            </a:extLst>
-          </p:cNvPr>
-          <p:cNvSpPr txBox="1"/>
-          <p:nvPr/>
-        </p:nvSpPr>
-        <p:spPr>
-          <a:xfrm>
-            <a:off x="-10886" y="6629400"/>
-            <a:ext cx="5192486" cy="276999"/>
-          </a:xfrm>
-          <a:prstGeom prst="rect">
-            <a:avLst/>
-          </a:prstGeom>
-          <a:noFill/>
-        </p:spPr>
-        <p:txBody>
-          <a:bodyPr wrap="square" rtlCol="0">
-            <a:spAutoFit/>
-          </a:bodyPr>
-          <a:lstStyle/>
-          <a:p>
-            <a:r>
-              <a:rPr lang="en-US" sz="1200" dirty="0"/>
-              <a:t>Source:  https://</a:t>
-            </a:r>
-            <a:r>
-              <a:rPr lang="en-US" sz="1200" dirty="0" err="1"/>
-              <a:t>reactjs.org</a:t>
-            </a:r>
-            <a:r>
-              <a:rPr lang="en-US" sz="1200" dirty="0"/>
-              <a:t>/docs/handling-</a:t>
-            </a:r>
-            <a:r>
-              <a:rPr lang="en-US" sz="1200" dirty="0" err="1"/>
-              <a:t>events.html</a:t>
-            </a:r>
-            <a:endParaRPr lang="en-US" sz="1200" dirty="0"/>
-          </a:p>
-        </p:txBody>
-      </p:sp>
-      <p:sp>
-        <p:nvSpPr>
-          <p:cNvPr id="5" name="TextBox 4">
-            <a:extLst>
-              <a:ext uri="{FF2B5EF4-FFF2-40B4-BE49-F238E27FC236}">
-                <a16:creationId xmlns:a16="http://schemas.microsoft.com/office/drawing/2014/main" id="{5186C368-7C3A-8240-911F-9C466113512E}"/>
-              </a:ext>
-            </a:extLst>
-          </p:cNvPr>
-          <p:cNvSpPr txBox="1"/>
-          <p:nvPr/>
-        </p:nvSpPr>
-        <p:spPr>
-          <a:xfrm>
-            <a:off x="838200" y="1905000"/>
-            <a:ext cx="10744200" cy="4062651"/>
-          </a:xfrm>
-          <a:prstGeom prst="rect">
-            <a:avLst/>
-          </a:prstGeom>
-          <a:noFill/>
-        </p:spPr>
-        <p:txBody>
-          <a:bodyPr wrap="square" rtlCol="0">
-            <a:spAutoFit/>
-          </a:bodyPr>
-          <a:lstStyle/>
-          <a:p>
-            <a:r>
-              <a:rPr lang="en-US" sz="2400" dirty="0" err="1"/>
-              <a:t>Next.js</a:t>
-            </a:r>
-            <a:r>
-              <a:rPr lang="en-US" sz="2400" dirty="0"/>
-              <a:t> is a universal JavaScript framework that runs in the browser and the server. It offers developers an easy way to get started, and as it uses </a:t>
-            </a:r>
-            <a:r>
-              <a:rPr lang="en-US" sz="2400" dirty="0" err="1"/>
-              <a:t>React.js</a:t>
-            </a:r>
-            <a:r>
-              <a:rPr lang="en-US" sz="2400" dirty="0"/>
-              <a:t> for templating. </a:t>
-            </a:r>
-          </a:p>
-          <a:p>
-            <a:endParaRPr lang="en-US" sz="2400" dirty="0"/>
-          </a:p>
-          <a:p>
-            <a:r>
-              <a:rPr lang="en-US" sz="2400" dirty="0"/>
-              <a:t> It is also a straightforward way for developers with React experience to get productive fast.</a:t>
-            </a:r>
-          </a:p>
-          <a:p>
-            <a:endParaRPr lang="en-US" sz="2400" dirty="0"/>
-          </a:p>
-          <a:p>
-            <a:endParaRPr lang="en-US" sz="2400" dirty="0"/>
-          </a:p>
-          <a:p>
-            <a:r>
-              <a:rPr lang="en-US" sz="2400" dirty="0"/>
-              <a:t>The advantages of this approach is to be able to create Rich User experiences in a uniform way, without compromising Search Engine Optimization (SEO) factors that are key to good ranking on Google and other search engines. </a:t>
-            </a:r>
-          </a:p>
-          <a:p>
-            <a:endParaRPr lang="en-US" dirty="0"/>
-          </a:p>
-        </p:txBody>
-      </p:sp>
-    </p:spTree>
-  </p:cSld>
-  <p:clrMapOvr>
-    <a:masterClrMapping/>
-  </p:clrMapOvr>
-</p:sld>
-</file>
-
-<file path=ppt/slides/slide20.xml><?xml version="1.0" encoding="utf-8"?>
+<file path=ppt/slides/slide21.xml><?xml version="1.0" encoding="utf-8"?>
 <p:sld xmlns:a="http://schemas.openxmlformats.org/drawingml/2006/main" xmlns:r="http://schemas.openxmlformats.org/officeDocument/2006/relationships" xmlns:p="http://schemas.openxmlformats.org/presentationml/2006/main">
   <p:cSld>
     <p:spTree>
@@ -9860,7 +10107,7 @@
 </p:sld>
 </file>
 
-<file path=ppt/slides/slide21.xml><?xml version="1.0" encoding="utf-8"?>
+<file path=ppt/slides/slide22.xml><?xml version="1.0" encoding="utf-8"?>
 <p:sld xmlns:a="http://schemas.openxmlformats.org/drawingml/2006/main" xmlns:r="http://schemas.openxmlformats.org/officeDocument/2006/relationships" xmlns:p="http://schemas.openxmlformats.org/presentationml/2006/main">
   <p:cSld>
     <p:spTree>
@@ -10111,7 +10358,7 @@
 </p:sld>
 </file>
 
-<file path=ppt/slides/slide22.xml><?xml version="1.0" encoding="utf-8"?>
+<file path=ppt/slides/slide23.xml><?xml version="1.0" encoding="utf-8"?>
 <p:sld xmlns:a="http://schemas.openxmlformats.org/drawingml/2006/main" xmlns:r="http://schemas.openxmlformats.org/officeDocument/2006/relationships" xmlns:p="http://schemas.openxmlformats.org/presentationml/2006/main">
   <p:cSld>
     <p:spTree>
@@ -10453,7 +10700,7 @@
 </p:sld>
 </file>
 
-<file path=ppt/slides/slide23.xml><?xml version="1.0" encoding="utf-8"?>
+<file path=ppt/slides/slide24.xml><?xml version="1.0" encoding="utf-8"?>
 <p:sld xmlns:a="http://schemas.openxmlformats.org/drawingml/2006/main" xmlns:r="http://schemas.openxmlformats.org/officeDocument/2006/relationships" xmlns:p="http://schemas.openxmlformats.org/presentationml/2006/main">
   <p:cSld>
     <p:spTree>
@@ -10792,7 +11039,7 @@
 </p:sld>
 </file>
 
-<file path=ppt/slides/slide24.xml><?xml version="1.0" encoding="utf-8"?>
+<file path=ppt/slides/slide25.xml><?xml version="1.0" encoding="utf-8"?>
 <p:sld xmlns:a="http://schemas.openxmlformats.org/drawingml/2006/main" xmlns:r="http://schemas.openxmlformats.org/officeDocument/2006/relationships" xmlns:p="http://schemas.openxmlformats.org/presentationml/2006/main">
   <p:cSld>
     <p:spTree>
@@ -11033,257 +11280,6 @@
     <p:extLst>
       <p:ext uri="{BB962C8B-B14F-4D97-AF65-F5344CB8AC3E}">
         <p14:creationId xmlns:p14="http://schemas.microsoft.com/office/powerpoint/2010/main" val="406508600"/>
-      </p:ext>
-    </p:extLst>
-  </p:cSld>
-  <p:clrMapOvr>
-    <a:masterClrMapping/>
-  </p:clrMapOvr>
-</p:sld>
-</file>
-
-<file path=ppt/slides/slide25.xml><?xml version="1.0" encoding="utf-8"?>
-<p:sld xmlns:a="http://schemas.openxmlformats.org/drawingml/2006/main" xmlns:r="http://schemas.openxmlformats.org/officeDocument/2006/relationships" xmlns:p="http://schemas.openxmlformats.org/presentationml/2006/main">
-  <p:cSld>
-    <p:spTree>
-      <p:nvGrpSpPr>
-        <p:cNvPr id="1" name=""/>
-        <p:cNvGrpSpPr/>
-        <p:nvPr/>
-      </p:nvGrpSpPr>
-      <p:grpSpPr>
-        <a:xfrm>
-          <a:off x="0" y="0"/>
-          <a:ext cx="0" cy="0"/>
-          <a:chOff x="0" y="0"/>
-          <a:chExt cx="0" cy="0"/>
-        </a:xfrm>
-      </p:grpSpPr>
-      <p:sp>
-        <p:nvSpPr>
-          <p:cNvPr id="2" name="object 2"/>
-          <p:cNvSpPr/>
-          <p:nvPr/>
-        </p:nvSpPr>
-        <p:spPr>
-          <a:xfrm>
-            <a:off x="0" y="6334316"/>
-            <a:ext cx="12192000" cy="66040"/>
-          </a:xfrm>
-          <a:custGeom>
-            <a:avLst/>
-            <a:gdLst/>
-            <a:ahLst/>
-            <a:cxnLst/>
-            <a:rect l="l" t="t" r="r" b="b"/>
-            <a:pathLst>
-              <a:path w="12192000" h="66039">
-                <a:moveTo>
-                  <a:pt x="0" y="65998"/>
-                </a:moveTo>
-                <a:lnTo>
-                  <a:pt x="12192001" y="65998"/>
-                </a:lnTo>
-                <a:lnTo>
-                  <a:pt x="12192001" y="0"/>
-                </a:lnTo>
-                <a:lnTo>
-                  <a:pt x="0" y="0"/>
-                </a:lnTo>
-                <a:lnTo>
-                  <a:pt x="0" y="65998"/>
-                </a:lnTo>
-                <a:close/>
-              </a:path>
-            </a:pathLst>
-          </a:custGeom>
-          <a:solidFill>
-            <a:srgbClr val="E48312"/>
-          </a:solidFill>
-        </p:spPr>
-        <p:txBody>
-          <a:bodyPr wrap="square" lIns="0" tIns="0" rIns="0" bIns="0" rtlCol="0"/>
-          <a:lstStyle/>
-          <a:p>
-            <a:endParaRPr/>
-          </a:p>
-        </p:txBody>
-      </p:sp>
-      <p:sp>
-        <p:nvSpPr>
-          <p:cNvPr id="3" name="object 3"/>
-          <p:cNvSpPr/>
-          <p:nvPr/>
-        </p:nvSpPr>
-        <p:spPr>
-          <a:xfrm>
-            <a:off x="1193531" y="1737845"/>
-            <a:ext cx="9966960" cy="0"/>
-          </a:xfrm>
-          <a:custGeom>
-            <a:avLst/>
-            <a:gdLst/>
-            <a:ahLst/>
-            <a:cxnLst/>
-            <a:rect l="l" t="t" r="r" b="b"/>
-            <a:pathLst>
-              <a:path w="9966960">
-                <a:moveTo>
-                  <a:pt x="0" y="0"/>
-                </a:moveTo>
-                <a:lnTo>
-                  <a:pt x="9966960" y="1"/>
-                </a:lnTo>
-              </a:path>
-            </a:pathLst>
-          </a:custGeom>
-          <a:ln w="8466">
-            <a:solidFill>
-              <a:srgbClr val="7F7F7F"/>
-            </a:solidFill>
-          </a:ln>
-        </p:spPr>
-        <p:txBody>
-          <a:bodyPr wrap="square" lIns="0" tIns="0" rIns="0" bIns="0" rtlCol="0"/>
-          <a:lstStyle/>
-          <a:p>
-            <a:endParaRPr/>
-          </a:p>
-        </p:txBody>
-      </p:sp>
-      <p:sp>
-        <p:nvSpPr>
-          <p:cNvPr id="4" name="object 4"/>
-          <p:cNvSpPr txBox="1">
-            <a:spLocks noGrp="1"/>
-          </p:cNvSpPr>
-          <p:nvPr>
-            <p:ph type="title"/>
-          </p:nvPr>
-        </p:nvSpPr>
-        <p:spPr>
-          <a:xfrm>
-            <a:off x="1176020" y="910166"/>
-            <a:ext cx="6824980" cy="751488"/>
-          </a:xfrm>
-          <a:prstGeom prst="rect">
-            <a:avLst/>
-          </a:prstGeom>
-        </p:spPr>
-        <p:txBody>
-          <a:bodyPr vert="horz" wrap="square" lIns="0" tIns="12700" rIns="0" bIns="0" rtlCol="0">
-            <a:spAutoFit/>
-          </a:bodyPr>
-          <a:lstStyle/>
-          <a:p>
-            <a:pPr marL="12700">
-              <a:lnSpc>
-                <a:spcPct val="100000"/>
-              </a:lnSpc>
-              <a:spcBef>
-                <a:spcPts val="100"/>
-              </a:spcBef>
-            </a:pPr>
-            <a:r>
-              <a:rPr lang="en-US" sz="4800" dirty="0">
-                <a:solidFill>
-                  <a:srgbClr val="404040"/>
-                </a:solidFill>
-              </a:rPr>
-              <a:t>Static Files</a:t>
-            </a:r>
-            <a:endParaRPr sz="4800" dirty="0"/>
-          </a:p>
-        </p:txBody>
-      </p:sp>
-      <p:sp>
-        <p:nvSpPr>
-          <p:cNvPr id="7" name="TextBox 6">
-            <a:extLst>
-              <a:ext uri="{FF2B5EF4-FFF2-40B4-BE49-F238E27FC236}">
-                <a16:creationId xmlns:a16="http://schemas.microsoft.com/office/drawing/2014/main" id="{AFBA96A7-5F05-3842-8A2C-899733C37A06}"/>
-              </a:ext>
-            </a:extLst>
-          </p:cNvPr>
-          <p:cNvSpPr txBox="1"/>
-          <p:nvPr/>
-        </p:nvSpPr>
-        <p:spPr>
-          <a:xfrm>
-            <a:off x="-10886" y="6629400"/>
-            <a:ext cx="5192486" cy="276999"/>
-          </a:xfrm>
-          <a:prstGeom prst="rect">
-            <a:avLst/>
-          </a:prstGeom>
-          <a:noFill/>
-        </p:spPr>
-        <p:txBody>
-          <a:bodyPr wrap="square" rtlCol="0">
-            <a:spAutoFit/>
-          </a:bodyPr>
-          <a:lstStyle/>
-          <a:p>
-            <a:r>
-              <a:rPr lang="en-US" sz="1200" dirty="0"/>
-              <a:t>Source:  https://</a:t>
-            </a:r>
-            <a:r>
-              <a:rPr lang="en-US" sz="1200" dirty="0" err="1"/>
-              <a:t>reactjs.org</a:t>
-            </a:r>
-            <a:r>
-              <a:rPr lang="en-US" sz="1200" dirty="0"/>
-              <a:t>/docs/handling-</a:t>
-            </a:r>
-            <a:r>
-              <a:rPr lang="en-US" sz="1200" dirty="0" err="1"/>
-              <a:t>events.html</a:t>
-            </a:r>
-            <a:endParaRPr lang="en-US" sz="1200" dirty="0"/>
-          </a:p>
-        </p:txBody>
-      </p:sp>
-      <p:pic>
-        <p:nvPicPr>
-          <p:cNvPr id="8" name="Picture 7" descr="A screenshot of a social media post&#10;&#10;Description automatically generated">
-            <a:extLst>
-              <a:ext uri="{FF2B5EF4-FFF2-40B4-BE49-F238E27FC236}">
-                <a16:creationId xmlns:a16="http://schemas.microsoft.com/office/drawing/2014/main" id="{E6C4E603-0B0B-894A-8448-DC608CCD35EF}"/>
-              </a:ext>
-            </a:extLst>
-          </p:cNvPr>
-          <p:cNvPicPr>
-            <a:picLocks noChangeAspect="1"/>
-          </p:cNvPicPr>
-          <p:nvPr/>
-        </p:nvPicPr>
-        <p:blipFill>
-          <a:blip r:embed="rId3">
-            <a:extLst>
-              <a:ext uri="{28A0092B-C50C-407E-A947-70E740481C1C}">
-                <a14:useLocalDpi xmlns:a14="http://schemas.microsoft.com/office/drawing/2010/main" val="0"/>
-              </a:ext>
-            </a:extLst>
-          </a:blip>
-          <a:stretch>
-            <a:fillRect/>
-          </a:stretch>
-        </p:blipFill>
-        <p:spPr>
-          <a:xfrm>
-            <a:off x="4394977" y="1161416"/>
-            <a:ext cx="6603492" cy="4981956"/>
-          </a:xfrm>
-          <a:prstGeom prst="rect">
-            <a:avLst/>
-          </a:prstGeom>
-        </p:spPr>
-      </p:pic>
-    </p:spTree>
-    <p:extLst>
-      <p:ext uri="{BB962C8B-B14F-4D97-AF65-F5344CB8AC3E}">
-        <p14:creationId xmlns:p14="http://schemas.microsoft.com/office/powerpoint/2010/main" val="193864587"/>
       </p:ext>
     </p:extLst>
   </p:cSld>
@@ -12795,6 +12791,257 @@
         <p:spPr>
           <a:xfrm>
             <a:off x="1176020" y="910166"/>
+            <a:ext cx="6824980" cy="751488"/>
+          </a:xfrm>
+          <a:prstGeom prst="rect">
+            <a:avLst/>
+          </a:prstGeom>
+        </p:spPr>
+        <p:txBody>
+          <a:bodyPr vert="horz" wrap="square" lIns="0" tIns="12700" rIns="0" bIns="0" rtlCol="0">
+            <a:spAutoFit/>
+          </a:bodyPr>
+          <a:lstStyle/>
+          <a:p>
+            <a:pPr marL="12700">
+              <a:lnSpc>
+                <a:spcPct val="100000"/>
+              </a:lnSpc>
+              <a:spcBef>
+                <a:spcPts val="100"/>
+              </a:spcBef>
+            </a:pPr>
+            <a:r>
+              <a:rPr lang="en-US" sz="4800" dirty="0">
+                <a:solidFill>
+                  <a:srgbClr val="404040"/>
+                </a:solidFill>
+              </a:rPr>
+              <a:t>Static Files</a:t>
+            </a:r>
+            <a:endParaRPr sz="4800" dirty="0"/>
+          </a:p>
+        </p:txBody>
+      </p:sp>
+      <p:sp>
+        <p:nvSpPr>
+          <p:cNvPr id="7" name="TextBox 6">
+            <a:extLst>
+              <a:ext uri="{FF2B5EF4-FFF2-40B4-BE49-F238E27FC236}">
+                <a16:creationId xmlns:a16="http://schemas.microsoft.com/office/drawing/2014/main" id="{AFBA96A7-5F05-3842-8A2C-899733C37A06}"/>
+              </a:ext>
+            </a:extLst>
+          </p:cNvPr>
+          <p:cNvSpPr txBox="1"/>
+          <p:nvPr/>
+        </p:nvSpPr>
+        <p:spPr>
+          <a:xfrm>
+            <a:off x="-10886" y="6629400"/>
+            <a:ext cx="5192486" cy="276999"/>
+          </a:xfrm>
+          <a:prstGeom prst="rect">
+            <a:avLst/>
+          </a:prstGeom>
+          <a:noFill/>
+        </p:spPr>
+        <p:txBody>
+          <a:bodyPr wrap="square" rtlCol="0">
+            <a:spAutoFit/>
+          </a:bodyPr>
+          <a:lstStyle/>
+          <a:p>
+            <a:r>
+              <a:rPr lang="en-US" sz="1200" dirty="0"/>
+              <a:t>Source:  https://</a:t>
+            </a:r>
+            <a:r>
+              <a:rPr lang="en-US" sz="1200" dirty="0" err="1"/>
+              <a:t>reactjs.org</a:t>
+            </a:r>
+            <a:r>
+              <a:rPr lang="en-US" sz="1200" dirty="0"/>
+              <a:t>/docs/handling-</a:t>
+            </a:r>
+            <a:r>
+              <a:rPr lang="en-US" sz="1200" dirty="0" err="1"/>
+              <a:t>events.html</a:t>
+            </a:r>
+            <a:endParaRPr lang="en-US" sz="1200" dirty="0"/>
+          </a:p>
+        </p:txBody>
+      </p:sp>
+      <p:pic>
+        <p:nvPicPr>
+          <p:cNvPr id="8" name="Picture 7" descr="A screenshot of a social media post&#10;&#10;Description automatically generated">
+            <a:extLst>
+              <a:ext uri="{FF2B5EF4-FFF2-40B4-BE49-F238E27FC236}">
+                <a16:creationId xmlns:a16="http://schemas.microsoft.com/office/drawing/2014/main" id="{E6C4E603-0B0B-894A-8448-DC608CCD35EF}"/>
+              </a:ext>
+            </a:extLst>
+          </p:cNvPr>
+          <p:cNvPicPr>
+            <a:picLocks noChangeAspect="1"/>
+          </p:cNvPicPr>
+          <p:nvPr/>
+        </p:nvPicPr>
+        <p:blipFill>
+          <a:blip r:embed="rId3">
+            <a:extLst>
+              <a:ext uri="{28A0092B-C50C-407E-A947-70E740481C1C}">
+                <a14:useLocalDpi xmlns:a14="http://schemas.microsoft.com/office/drawing/2010/main" val="0"/>
+              </a:ext>
+            </a:extLst>
+          </a:blip>
+          <a:stretch>
+            <a:fillRect/>
+          </a:stretch>
+        </p:blipFill>
+        <p:spPr>
+          <a:xfrm>
+            <a:off x="4394977" y="1161416"/>
+            <a:ext cx="6603492" cy="4981956"/>
+          </a:xfrm>
+          <a:prstGeom prst="rect">
+            <a:avLst/>
+          </a:prstGeom>
+        </p:spPr>
+      </p:pic>
+    </p:spTree>
+    <p:extLst>
+      <p:ext uri="{BB962C8B-B14F-4D97-AF65-F5344CB8AC3E}">
+        <p14:creationId xmlns:p14="http://schemas.microsoft.com/office/powerpoint/2010/main" val="193864587"/>
+      </p:ext>
+    </p:extLst>
+  </p:cSld>
+  <p:clrMapOvr>
+    <a:masterClrMapping/>
+  </p:clrMapOvr>
+</p:sld>
+</file>
+
+<file path=ppt/slides/slide9.xml><?xml version="1.0" encoding="utf-8"?>
+<p:sld xmlns:a="http://schemas.openxmlformats.org/drawingml/2006/main" xmlns:r="http://schemas.openxmlformats.org/officeDocument/2006/relationships" xmlns:p="http://schemas.openxmlformats.org/presentationml/2006/main">
+  <p:cSld>
+    <p:spTree>
+      <p:nvGrpSpPr>
+        <p:cNvPr id="1" name=""/>
+        <p:cNvGrpSpPr/>
+        <p:nvPr/>
+      </p:nvGrpSpPr>
+      <p:grpSpPr>
+        <a:xfrm>
+          <a:off x="0" y="0"/>
+          <a:ext cx="0" cy="0"/>
+          <a:chOff x="0" y="0"/>
+          <a:chExt cx="0" cy="0"/>
+        </a:xfrm>
+      </p:grpSpPr>
+      <p:sp>
+        <p:nvSpPr>
+          <p:cNvPr id="2" name="object 2"/>
+          <p:cNvSpPr/>
+          <p:nvPr/>
+        </p:nvSpPr>
+        <p:spPr>
+          <a:xfrm>
+            <a:off x="0" y="6334316"/>
+            <a:ext cx="12192000" cy="66040"/>
+          </a:xfrm>
+          <a:custGeom>
+            <a:avLst/>
+            <a:gdLst/>
+            <a:ahLst/>
+            <a:cxnLst/>
+            <a:rect l="l" t="t" r="r" b="b"/>
+            <a:pathLst>
+              <a:path w="12192000" h="66039">
+                <a:moveTo>
+                  <a:pt x="0" y="65998"/>
+                </a:moveTo>
+                <a:lnTo>
+                  <a:pt x="12192001" y="65998"/>
+                </a:lnTo>
+                <a:lnTo>
+                  <a:pt x="12192001" y="0"/>
+                </a:lnTo>
+                <a:lnTo>
+                  <a:pt x="0" y="0"/>
+                </a:lnTo>
+                <a:lnTo>
+                  <a:pt x="0" y="65998"/>
+                </a:lnTo>
+                <a:close/>
+              </a:path>
+            </a:pathLst>
+          </a:custGeom>
+          <a:solidFill>
+            <a:srgbClr val="E48312"/>
+          </a:solidFill>
+        </p:spPr>
+        <p:txBody>
+          <a:bodyPr wrap="square" lIns="0" tIns="0" rIns="0" bIns="0" rtlCol="0"/>
+          <a:lstStyle/>
+          <a:p>
+            <a:endParaRPr/>
+          </a:p>
+        </p:txBody>
+      </p:sp>
+      <p:sp>
+        <p:nvSpPr>
+          <p:cNvPr id="3" name="object 3"/>
+          <p:cNvSpPr/>
+          <p:nvPr/>
+        </p:nvSpPr>
+        <p:spPr>
+          <a:xfrm>
+            <a:off x="1193531" y="1737845"/>
+            <a:ext cx="9966960" cy="0"/>
+          </a:xfrm>
+          <a:custGeom>
+            <a:avLst/>
+            <a:gdLst/>
+            <a:ahLst/>
+            <a:cxnLst/>
+            <a:rect l="l" t="t" r="r" b="b"/>
+            <a:pathLst>
+              <a:path w="9966960">
+                <a:moveTo>
+                  <a:pt x="0" y="0"/>
+                </a:moveTo>
+                <a:lnTo>
+                  <a:pt x="9966960" y="1"/>
+                </a:lnTo>
+              </a:path>
+            </a:pathLst>
+          </a:custGeom>
+          <a:ln w="8466">
+            <a:solidFill>
+              <a:srgbClr val="7F7F7F"/>
+            </a:solidFill>
+          </a:ln>
+        </p:spPr>
+        <p:txBody>
+          <a:bodyPr wrap="square" lIns="0" tIns="0" rIns="0" bIns="0" rtlCol="0"/>
+          <a:lstStyle/>
+          <a:p>
+            <a:endParaRPr/>
+          </a:p>
+        </p:txBody>
+      </p:sp>
+      <p:sp>
+        <p:nvSpPr>
+          <p:cNvPr id="4" name="object 4"/>
+          <p:cNvSpPr txBox="1">
+            <a:spLocks noGrp="1"/>
+          </p:cNvSpPr>
+          <p:nvPr>
+            <p:ph type="title"/>
+          </p:nvPr>
+        </p:nvSpPr>
+        <p:spPr>
+          <a:xfrm>
+            <a:off x="1176020" y="910166"/>
             <a:ext cx="8915400" cy="751488"/>
           </a:xfrm>
           <a:prstGeom prst="rect">
@@ -13022,257 +13269,6 @@
     <p:extLst>
       <p:ext uri="{BB962C8B-B14F-4D97-AF65-F5344CB8AC3E}">
         <p14:creationId xmlns:p14="http://schemas.microsoft.com/office/powerpoint/2010/main" val="1416430213"/>
-      </p:ext>
-    </p:extLst>
-  </p:cSld>
-  <p:clrMapOvr>
-    <a:masterClrMapping/>
-  </p:clrMapOvr>
-</p:sld>
-</file>
-
-<file path=ppt/slides/slide9.xml><?xml version="1.0" encoding="utf-8"?>
-<p:sld xmlns:a="http://schemas.openxmlformats.org/drawingml/2006/main" xmlns:r="http://schemas.openxmlformats.org/officeDocument/2006/relationships" xmlns:p="http://schemas.openxmlformats.org/presentationml/2006/main">
-  <p:cSld>
-    <p:spTree>
-      <p:nvGrpSpPr>
-        <p:cNvPr id="1" name=""/>
-        <p:cNvGrpSpPr/>
-        <p:nvPr/>
-      </p:nvGrpSpPr>
-      <p:grpSpPr>
-        <a:xfrm>
-          <a:off x="0" y="0"/>
-          <a:ext cx="0" cy="0"/>
-          <a:chOff x="0" y="0"/>
-          <a:chExt cx="0" cy="0"/>
-        </a:xfrm>
-      </p:grpSpPr>
-      <p:sp>
-        <p:nvSpPr>
-          <p:cNvPr id="2" name="object 2"/>
-          <p:cNvSpPr/>
-          <p:nvPr/>
-        </p:nvSpPr>
-        <p:spPr>
-          <a:xfrm>
-            <a:off x="0" y="6334316"/>
-            <a:ext cx="12192000" cy="66040"/>
-          </a:xfrm>
-          <a:custGeom>
-            <a:avLst/>
-            <a:gdLst/>
-            <a:ahLst/>
-            <a:cxnLst/>
-            <a:rect l="l" t="t" r="r" b="b"/>
-            <a:pathLst>
-              <a:path w="12192000" h="66039">
-                <a:moveTo>
-                  <a:pt x="0" y="65998"/>
-                </a:moveTo>
-                <a:lnTo>
-                  <a:pt x="12192001" y="65998"/>
-                </a:lnTo>
-                <a:lnTo>
-                  <a:pt x="12192001" y="0"/>
-                </a:lnTo>
-                <a:lnTo>
-                  <a:pt x="0" y="0"/>
-                </a:lnTo>
-                <a:lnTo>
-                  <a:pt x="0" y="65998"/>
-                </a:lnTo>
-                <a:close/>
-              </a:path>
-            </a:pathLst>
-          </a:custGeom>
-          <a:solidFill>
-            <a:srgbClr val="E48312"/>
-          </a:solidFill>
-        </p:spPr>
-        <p:txBody>
-          <a:bodyPr wrap="square" lIns="0" tIns="0" rIns="0" bIns="0" rtlCol="0"/>
-          <a:lstStyle/>
-          <a:p>
-            <a:endParaRPr/>
-          </a:p>
-        </p:txBody>
-      </p:sp>
-      <p:sp>
-        <p:nvSpPr>
-          <p:cNvPr id="3" name="object 3"/>
-          <p:cNvSpPr/>
-          <p:nvPr/>
-        </p:nvSpPr>
-        <p:spPr>
-          <a:xfrm>
-            <a:off x="1193531" y="1737845"/>
-            <a:ext cx="9966960" cy="0"/>
-          </a:xfrm>
-          <a:custGeom>
-            <a:avLst/>
-            <a:gdLst/>
-            <a:ahLst/>
-            <a:cxnLst/>
-            <a:rect l="l" t="t" r="r" b="b"/>
-            <a:pathLst>
-              <a:path w="9966960">
-                <a:moveTo>
-                  <a:pt x="0" y="0"/>
-                </a:moveTo>
-                <a:lnTo>
-                  <a:pt x="9966960" y="1"/>
-                </a:lnTo>
-              </a:path>
-            </a:pathLst>
-          </a:custGeom>
-          <a:ln w="8466">
-            <a:solidFill>
-              <a:srgbClr val="7F7F7F"/>
-            </a:solidFill>
-          </a:ln>
-        </p:spPr>
-        <p:txBody>
-          <a:bodyPr wrap="square" lIns="0" tIns="0" rIns="0" bIns="0" rtlCol="0"/>
-          <a:lstStyle/>
-          <a:p>
-            <a:endParaRPr/>
-          </a:p>
-        </p:txBody>
-      </p:sp>
-      <p:sp>
-        <p:nvSpPr>
-          <p:cNvPr id="4" name="object 4"/>
-          <p:cNvSpPr txBox="1">
-            <a:spLocks noGrp="1"/>
-          </p:cNvSpPr>
-          <p:nvPr>
-            <p:ph type="title"/>
-          </p:nvPr>
-        </p:nvSpPr>
-        <p:spPr>
-          <a:xfrm>
-            <a:off x="1176020" y="910166"/>
-            <a:ext cx="8915400" cy="751488"/>
-          </a:xfrm>
-          <a:prstGeom prst="rect">
-            <a:avLst/>
-          </a:prstGeom>
-        </p:spPr>
-        <p:txBody>
-          <a:bodyPr vert="horz" wrap="square" lIns="0" tIns="12700" rIns="0" bIns="0" rtlCol="0">
-            <a:spAutoFit/>
-          </a:bodyPr>
-          <a:lstStyle/>
-          <a:p>
-            <a:pPr marL="12700">
-              <a:lnSpc>
-                <a:spcPct val="100000"/>
-              </a:lnSpc>
-              <a:spcBef>
-                <a:spcPts val="100"/>
-              </a:spcBef>
-            </a:pPr>
-            <a:r>
-              <a:rPr lang="en-US" sz="4800" dirty="0">
-                <a:solidFill>
-                  <a:srgbClr val="404040"/>
-                </a:solidFill>
-              </a:rPr>
-              <a:t>Using Shared Components</a:t>
-            </a:r>
-            <a:endParaRPr sz="4800" dirty="0"/>
-          </a:p>
-        </p:txBody>
-      </p:sp>
-      <p:sp>
-        <p:nvSpPr>
-          <p:cNvPr id="7" name="TextBox 6">
-            <a:extLst>
-              <a:ext uri="{FF2B5EF4-FFF2-40B4-BE49-F238E27FC236}">
-                <a16:creationId xmlns:a16="http://schemas.microsoft.com/office/drawing/2014/main" id="{AFBA96A7-5F05-3842-8A2C-899733C37A06}"/>
-              </a:ext>
-            </a:extLst>
-          </p:cNvPr>
-          <p:cNvSpPr txBox="1"/>
-          <p:nvPr/>
-        </p:nvSpPr>
-        <p:spPr>
-          <a:xfrm>
-            <a:off x="-10886" y="6629400"/>
-            <a:ext cx="5192486" cy="276999"/>
-          </a:xfrm>
-          <a:prstGeom prst="rect">
-            <a:avLst/>
-          </a:prstGeom>
-          <a:noFill/>
-        </p:spPr>
-        <p:txBody>
-          <a:bodyPr wrap="square" rtlCol="0">
-            <a:spAutoFit/>
-          </a:bodyPr>
-          <a:lstStyle/>
-          <a:p>
-            <a:r>
-              <a:rPr lang="en-US" sz="1200" dirty="0"/>
-              <a:t>Source:  https://</a:t>
-            </a:r>
-            <a:r>
-              <a:rPr lang="en-US" sz="1200" dirty="0" err="1"/>
-              <a:t>reactjs.org</a:t>
-            </a:r>
-            <a:r>
-              <a:rPr lang="en-US" sz="1200" dirty="0"/>
-              <a:t>/docs/handling-</a:t>
-            </a:r>
-            <a:r>
-              <a:rPr lang="en-US" sz="1200" dirty="0" err="1"/>
-              <a:t>events.html</a:t>
-            </a:r>
-            <a:endParaRPr lang="en-US" sz="1200" dirty="0"/>
-          </a:p>
-        </p:txBody>
-      </p:sp>
-      <p:pic>
-        <p:nvPicPr>
-          <p:cNvPr id="6" name="Picture 5" descr="A screenshot of a social media post&#10;&#10;Description automatically generated">
-            <a:extLst>
-              <a:ext uri="{FF2B5EF4-FFF2-40B4-BE49-F238E27FC236}">
-                <a16:creationId xmlns:a16="http://schemas.microsoft.com/office/drawing/2014/main" id="{C0768370-A848-7045-9528-8DBDBFCE63DA}"/>
-              </a:ext>
-            </a:extLst>
-          </p:cNvPr>
-          <p:cNvPicPr>
-            <a:picLocks noChangeAspect="1"/>
-          </p:cNvPicPr>
-          <p:nvPr/>
-        </p:nvPicPr>
-        <p:blipFill>
-          <a:blip r:embed="rId3">
-            <a:extLst>
-              <a:ext uri="{28A0092B-C50C-407E-A947-70E740481C1C}">
-                <a14:useLocalDpi xmlns:a14="http://schemas.microsoft.com/office/drawing/2010/main" val="0"/>
-              </a:ext>
-            </a:extLst>
-          </a:blip>
-          <a:stretch>
-            <a:fillRect/>
-          </a:stretch>
-        </p:blipFill>
-        <p:spPr>
-          <a:xfrm>
-            <a:off x="3940541" y="1661654"/>
-            <a:ext cx="4472940" cy="4663440"/>
-          </a:xfrm>
-          <a:prstGeom prst="rect">
-            <a:avLst/>
-          </a:prstGeom>
-        </p:spPr>
-      </p:pic>
-    </p:spTree>
-    <p:extLst>
-      <p:ext uri="{BB962C8B-B14F-4D97-AF65-F5344CB8AC3E}">
-        <p14:creationId xmlns:p14="http://schemas.microsoft.com/office/powerpoint/2010/main" val="2443201002"/>
       </p:ext>
     </p:extLst>
   </p:cSld>

</xml_diff>